<commit_message>
Ardi mas estou no topo
</commit_message>
<xml_diff>
--- a/Apresentacao/apr1.pptx
+++ b/Apresentacao/apr1.pptx
@@ -105,6 +105,11 @@
       </a:defRPr>
     </a:lvl9pPr>
   </p:defaultTextStyle>
+  <p:extLst>
+    <p:ext uri="{EFAFB233-063F-42B5-8137-9DF3F51BA10A}">
+      <p15:sldGuideLst xmlns:p15="http://schemas.microsoft.com/office/powerpoint/2012/main"/>
+    </p:ext>
+  </p:extLst>
 </p:presentation>
 </file>
 
@@ -3527,19 +3532,19 @@
         </p:nvSpPr>
         <p:spPr>
           <a:xfrm>
-            <a:off x="8977745" y="3728851"/>
-            <a:ext cx="3214233" cy="3129149"/>
+            <a:off x="9229344" y="4108704"/>
+            <a:ext cx="2962634" cy="2749296"/>
           </a:xfrm>
         </p:spPr>
         <p:txBody>
           <a:bodyPr anchor="t">
-            <a:normAutofit lnSpcReduction="10000"/>
+            <a:normAutofit/>
           </a:bodyPr>
           <a:lstStyle/>
           <a:p>
             <a:pPr algn="l"/>
             <a:r>
-              <a:rPr lang="pt-PT" sz="2000" dirty="0"/>
+              <a:rPr lang="pt-PT" sz="1600" dirty="0"/>
               <a:t>Lei 18/19 – Gr. 16:</a:t>
             </a:r>
           </a:p>
@@ -3549,7 +3554,7 @@
               <a:buChar char="•"/>
             </a:pPr>
             <a:r>
-              <a:rPr lang="pt-PT" sz="2000" dirty="0"/>
+              <a:rPr lang="pt-PT" sz="1600" dirty="0"/>
               <a:t>André Salgueiro – A77617</a:t>
             </a:r>
           </a:p>
@@ -3559,7 +3564,7 @@
               <a:buChar char="•"/>
             </a:pPr>
             <a:r>
-              <a:rPr lang="pt-PT" sz="2000" dirty="0"/>
+              <a:rPr lang="pt-PT" sz="1600" dirty="0"/>
               <a:t>Bruno Carvalho – A76987</a:t>
             </a:r>
           </a:p>
@@ -3569,18 +3574,18 @@
               <a:buChar char="•"/>
             </a:pPr>
             <a:r>
-              <a:rPr lang="pt-PT" sz="2000" dirty="0"/>
+              <a:rPr lang="pt-PT" sz="1600" dirty="0"/>
               <a:t>Fábio Araújo – A78508</a:t>
             </a:r>
           </a:p>
           <a:p>
             <a:pPr algn="l"/>
-            <a:endParaRPr lang="pt-PT" sz="2000" dirty="0"/>
+            <a:endParaRPr lang="pt-PT" sz="1600" dirty="0"/>
           </a:p>
           <a:p>
             <a:pPr algn="l"/>
             <a:r>
-              <a:rPr lang="pt-PT" sz="2000" dirty="0"/>
+              <a:rPr lang="pt-PT" sz="1600" dirty="0"/>
               <a:t>Orientadores:</a:t>
             </a:r>
           </a:p>
@@ -3590,7 +3595,7 @@
               <a:buChar char="•"/>
             </a:pPr>
             <a:r>
-              <a:rPr lang="pt-PT" sz="2000" dirty="0"/>
+              <a:rPr lang="pt-PT" sz="1600" dirty="0"/>
               <a:t>Pedro Rangel Henriques</a:t>
             </a:r>
           </a:p>
@@ -3600,7 +3605,7 @@
               <a:buChar char="•"/>
             </a:pPr>
             <a:r>
-              <a:rPr lang="pt-PT" sz="2000" dirty="0"/>
+              <a:rPr lang="pt-PT" sz="1600" dirty="0"/>
               <a:t>Cristiana Araújo</a:t>
             </a:r>
           </a:p>

</xml_diff>